<commit_message>
Corrections to version control slides
</commit_message>
<xml_diff>
--- a/version-control slides.pptx
+++ b/version-control slides.pptx
@@ -15,13 +15,14 @@
     <p:sldId id="265" r:id="rId9"/>
     <p:sldId id="262" r:id="rId10"/>
     <p:sldId id="263" r:id="rId11"/>
-    <p:sldId id="266" r:id="rId12"/>
-    <p:sldId id="267" r:id="rId13"/>
-    <p:sldId id="268" r:id="rId14"/>
-    <p:sldId id="269" r:id="rId15"/>
-    <p:sldId id="270" r:id="rId16"/>
-    <p:sldId id="271" r:id="rId17"/>
-    <p:sldId id="272" r:id="rId18"/>
+    <p:sldId id="273" r:id="rId12"/>
+    <p:sldId id="266" r:id="rId13"/>
+    <p:sldId id="267" r:id="rId14"/>
+    <p:sldId id="268" r:id="rId15"/>
+    <p:sldId id="269" r:id="rId16"/>
+    <p:sldId id="270" r:id="rId17"/>
+    <p:sldId id="271" r:id="rId18"/>
+    <p:sldId id="272" r:id="rId19"/>
   </p:sldIdLst>
   <p:sldSz cx="9144000" cy="6858000" type="screen4x3"/>
   <p:notesSz cx="6858000" cy="9144000"/>
@@ -406,7 +407,7 @@
           <a:p>
             <a:fld id="{377677CB-039A-C144-8F7B-F3FF66CF6E9F}" type="datetimeFigureOut">
               <a:rPr lang="en-US" smtClean="0"/>
-              <a:t>07/05/2014</a:t>
+              <a:t>08/05/2014</a:t>
             </a:fld>
             <a:endParaRPr lang="en-US"/>
           </a:p>
@@ -598,7 +599,7 @@
           <a:p>
             <a:fld id="{377677CB-039A-C144-8F7B-F3FF66CF6E9F}" type="datetimeFigureOut">
               <a:rPr lang="en-US" smtClean="0"/>
-              <a:t>07/05/2014</a:t>
+              <a:t>08/05/2014</a:t>
             </a:fld>
             <a:endParaRPr lang="en-US"/>
           </a:p>
@@ -867,7 +868,7 @@
           <a:p>
             <a:fld id="{377677CB-039A-C144-8F7B-F3FF66CF6E9F}" type="datetimeFigureOut">
               <a:rPr lang="en-US" smtClean="0"/>
-              <a:t>07/05/2014</a:t>
+              <a:t>08/05/2014</a:t>
             </a:fld>
             <a:endParaRPr lang="en-US"/>
           </a:p>
@@ -1046,7 +1047,7 @@
           <a:p>
             <a:fld id="{377677CB-039A-C144-8F7B-F3FF66CF6E9F}" type="datetimeFigureOut">
               <a:rPr lang="en-US" smtClean="0"/>
-              <a:t>07/05/2014</a:t>
+              <a:t>08/05/2014</a:t>
             </a:fld>
             <a:endParaRPr lang="en-US"/>
           </a:p>
@@ -1215,7 +1216,7 @@
           <a:p>
             <a:fld id="{377677CB-039A-C144-8F7B-F3FF66CF6E9F}" type="datetimeFigureOut">
               <a:rPr lang="en-US" smtClean="0"/>
-              <a:t>07/05/2014</a:t>
+              <a:t>08/05/2014</a:t>
             </a:fld>
             <a:endParaRPr lang="en-US"/>
           </a:p>
@@ -1457,7 +1458,7 @@
           <a:p>
             <a:fld id="{377677CB-039A-C144-8F7B-F3FF66CF6E9F}" type="datetimeFigureOut">
               <a:rPr lang="en-US" smtClean="0"/>
-              <a:t>07/05/2014</a:t>
+              <a:t>08/05/2014</a:t>
             </a:fld>
             <a:endParaRPr lang="en-US"/>
           </a:p>
@@ -1780,7 +1781,7 @@
           <a:p>
             <a:fld id="{377677CB-039A-C144-8F7B-F3FF66CF6E9F}" type="datetimeFigureOut">
               <a:rPr lang="en-US" smtClean="0"/>
-              <a:t>07/05/2014</a:t>
+              <a:t>08/05/2014</a:t>
             </a:fld>
             <a:endParaRPr lang="en-US"/>
           </a:p>
@@ -2078,7 +2079,7 @@
           <a:p>
             <a:fld id="{377677CB-039A-C144-8F7B-F3FF66CF6E9F}" type="datetimeFigureOut">
               <a:rPr lang="en-US" smtClean="0"/>
-              <a:t>07/05/2014</a:t>
+              <a:t>08/05/2014</a:t>
             </a:fld>
             <a:endParaRPr lang="en-US"/>
           </a:p>
@@ -2534,7 +2535,7 @@
           <a:p>
             <a:fld id="{377677CB-039A-C144-8F7B-F3FF66CF6E9F}" type="datetimeFigureOut">
               <a:rPr lang="en-US" smtClean="0"/>
-              <a:t>07/05/2014</a:t>
+              <a:t>08/05/2014</a:t>
             </a:fld>
             <a:endParaRPr lang="en-US"/>
           </a:p>
@@ -2647,7 +2648,7 @@
           <a:p>
             <a:fld id="{377677CB-039A-C144-8F7B-F3FF66CF6E9F}" type="datetimeFigureOut">
               <a:rPr lang="en-US" smtClean="0"/>
-              <a:t>07/05/2014</a:t>
+              <a:t>08/05/2014</a:t>
             </a:fld>
             <a:endParaRPr lang="en-US"/>
           </a:p>
@@ -2737,7 +2738,7 @@
           <a:p>
             <a:fld id="{377677CB-039A-C144-8F7B-F3FF66CF6E9F}" type="datetimeFigureOut">
               <a:rPr lang="en-US" smtClean="0"/>
-              <a:t>07/05/2014</a:t>
+              <a:t>08/05/2014</a:t>
             </a:fld>
             <a:endParaRPr lang="en-US"/>
           </a:p>
@@ -3019,7 +3020,7 @@
           <a:p>
             <a:fld id="{377677CB-039A-C144-8F7B-F3FF66CF6E9F}" type="datetimeFigureOut">
               <a:rPr lang="en-US" smtClean="0"/>
-              <a:t>07/05/2014</a:t>
+              <a:t>08/05/2014</a:t>
             </a:fld>
             <a:endParaRPr lang="en-US"/>
           </a:p>
@@ -3225,7 +3226,7 @@
           <a:p>
             <a:fld id="{377677CB-039A-C144-8F7B-F3FF66CF6E9F}" type="datetimeFigureOut">
               <a:rPr lang="en-US" smtClean="0"/>
-              <a:t>07/05/2014</a:t>
+              <a:t>08/05/2014</a:t>
             </a:fld>
             <a:endParaRPr lang="en-US"/>
           </a:p>
@@ -3828,6 +3829,150 @@
           <a:chExt cx="0" cy="0"/>
         </a:xfrm>
       </p:grpSpPr>
+      <p:sp>
+        <p:nvSpPr>
+          <p:cNvPr id="2" name="Title 1"/>
+          <p:cNvSpPr>
+            <a:spLocks noGrp="1"/>
+          </p:cNvSpPr>
+          <p:nvPr>
+            <p:ph type="title"/>
+          </p:nvPr>
+        </p:nvSpPr>
+        <p:spPr/>
+        <p:txBody>
+          <a:bodyPr/>
+          <a:lstStyle/>
+          <a:p>
+            <a:pPr algn="l"/>
+            <a:r>
+              <a:rPr lang="en-US" b="1" dirty="0" smtClean="0"/>
+              <a:t>Git file modes:</a:t>
+            </a:r>
+            <a:endParaRPr lang="en-US" b="1" dirty="0"/>
+          </a:p>
+        </p:txBody>
+      </p:sp>
+      <p:sp>
+        <p:nvSpPr>
+          <p:cNvPr id="3" name="Content Placeholder 2"/>
+          <p:cNvSpPr>
+            <a:spLocks noGrp="1"/>
+          </p:cNvSpPr>
+          <p:nvPr>
+            <p:ph idx="1"/>
+          </p:nvPr>
+        </p:nvSpPr>
+        <p:spPr>
+          <a:xfrm>
+            <a:off x="306012" y="1444532"/>
+            <a:ext cx="8629518" cy="4812963"/>
+          </a:xfrm>
+        </p:spPr>
+        <p:txBody>
+          <a:bodyPr>
+            <a:normAutofit/>
+          </a:bodyPr>
+          <a:lstStyle/>
+          <a:p>
+            <a:pPr marL="0" indent="0">
+              <a:buNone/>
+            </a:pPr>
+            <a:r>
+              <a:rPr lang="en-US" sz="2000" dirty="0" smtClean="0"/>
+              <a:t>Git tracks file permissions:</a:t>
+            </a:r>
+          </a:p>
+          <a:p>
+            <a:r>
+              <a:rPr lang="en-US" sz="2000" dirty="0" smtClean="0"/>
+              <a:t>0100000000000000 </a:t>
+            </a:r>
+            <a:r>
+              <a:rPr lang="en-US" sz="2000" dirty="0"/>
+              <a:t>(040000): Directory</a:t>
+            </a:r>
+          </a:p>
+          <a:p>
+            <a:r>
+              <a:rPr lang="en-US" sz="2000" dirty="0"/>
+              <a:t>1000000110100100 (100644): Regular non-executable file</a:t>
+            </a:r>
+          </a:p>
+          <a:p>
+            <a:r>
+              <a:rPr lang="en-US" sz="2000" dirty="0"/>
+              <a:t>1000000110110100 (100664): Regular non-executable group</a:t>
+            </a:r>
+            <a:r>
+              <a:rPr lang="en-US" sz="2000" dirty="0" smtClean="0"/>
+              <a:t>-      </a:t>
+            </a:r>
+          </a:p>
+          <a:p>
+            <a:pPr marL="0" indent="0">
+              <a:buNone/>
+            </a:pPr>
+            <a:r>
+              <a:rPr lang="en-US" sz="2000" dirty="0" smtClean="0"/>
+              <a:t>                                                      writeable </a:t>
+            </a:r>
+            <a:r>
+              <a:rPr lang="en-US" sz="2000" dirty="0"/>
+              <a:t>file</a:t>
+            </a:r>
+          </a:p>
+          <a:p>
+            <a:r>
+              <a:rPr lang="en-US" sz="2000" dirty="0"/>
+              <a:t>1000000111101101 (100755): Regular executable file</a:t>
+            </a:r>
+          </a:p>
+          <a:p>
+            <a:r>
+              <a:rPr lang="en-US" sz="2000" dirty="0"/>
+              <a:t>1010000000000000 (120000): Symbolic link</a:t>
+            </a:r>
+          </a:p>
+          <a:p>
+            <a:r>
+              <a:rPr lang="tr-TR" sz="2000" dirty="0"/>
+              <a:t>1110000000000000 (160000): Gitlink</a:t>
+            </a:r>
+            <a:endParaRPr lang="en-US" sz="2000" dirty="0"/>
+          </a:p>
+        </p:txBody>
+      </p:sp>
+    </p:spTree>
+    <p:extLst>
+      <p:ext uri="{BB962C8B-B14F-4D97-AF65-F5344CB8AC3E}">
+        <p14:creationId xmlns:p14="http://schemas.microsoft.com/office/powerpoint/2010/main" val="273652542"/>
+      </p:ext>
+    </p:extLst>
+  </p:cSld>
+  <p:clrMapOvr>
+    <a:masterClrMapping/>
+  </p:clrMapOvr>
+</p:sld>
+</file>
+
+<file path=ppt/slides/slide12.xml><?xml version="1.0" encoding="utf-8"?>
+<p:sld xmlns:a="http://schemas.openxmlformats.org/drawingml/2006/main" xmlns:r="http://schemas.openxmlformats.org/officeDocument/2006/relationships" xmlns:p="http://schemas.openxmlformats.org/presentationml/2006/main">
+  <p:cSld>
+    <p:spTree>
+      <p:nvGrpSpPr>
+        <p:cNvPr id="1" name=""/>
+        <p:cNvGrpSpPr/>
+        <p:nvPr/>
+      </p:nvGrpSpPr>
+      <p:grpSpPr>
+        <a:xfrm>
+          <a:off x="0" y="0"/>
+          <a:ext cx="0" cy="0"/>
+          <a:chOff x="0" y="0"/>
+          <a:chExt cx="0" cy="0"/>
+        </a:xfrm>
+      </p:grpSpPr>
       <p:pic>
         <p:nvPicPr>
           <p:cNvPr id="4" name="Picture 3" descr="slide-6-638.jpg"/>
@@ -3878,7 +4023,7 @@
 </p:sld>
 </file>
 
-<file path=ppt/slides/slide12.xml><?xml version="1.0" encoding="utf-8"?>
+<file path=ppt/slides/slide13.xml><?xml version="1.0" encoding="utf-8"?>
 <p:sld xmlns:a="http://schemas.openxmlformats.org/drawingml/2006/main" xmlns:r="http://schemas.openxmlformats.org/officeDocument/2006/relationships" xmlns:p="http://schemas.openxmlformats.org/presentationml/2006/main">
   <p:cSld>
     <p:spTree>
@@ -3945,7 +4090,7 @@
 </p:sld>
 </file>
 
-<file path=ppt/slides/slide13.xml><?xml version="1.0" encoding="utf-8"?>
+<file path=ppt/slides/slide14.xml><?xml version="1.0" encoding="utf-8"?>
 <p:sld xmlns:a="http://schemas.openxmlformats.org/drawingml/2006/main" xmlns:r="http://schemas.openxmlformats.org/officeDocument/2006/relationships" xmlns:p="http://schemas.openxmlformats.org/presentationml/2006/main">
   <p:cSld>
     <p:spTree>
@@ -4012,7 +4157,7 @@
 </p:sld>
 </file>
 
-<file path=ppt/slides/slide14.xml><?xml version="1.0" encoding="utf-8"?>
+<file path=ppt/slides/slide15.xml><?xml version="1.0" encoding="utf-8"?>
 <p:sld xmlns:a="http://schemas.openxmlformats.org/drawingml/2006/main" xmlns:r="http://schemas.openxmlformats.org/officeDocument/2006/relationships" xmlns:p="http://schemas.openxmlformats.org/presentationml/2006/main">
   <p:cSld>
     <p:spTree>
@@ -4079,7 +4224,7 @@
 </p:sld>
 </file>
 
-<file path=ppt/slides/slide15.xml><?xml version="1.0" encoding="utf-8"?>
+<file path=ppt/slides/slide16.xml><?xml version="1.0" encoding="utf-8"?>
 <p:sld xmlns:a="http://schemas.openxmlformats.org/drawingml/2006/main" xmlns:r="http://schemas.openxmlformats.org/officeDocument/2006/relationships" xmlns:p="http://schemas.openxmlformats.org/presentationml/2006/main">
   <p:cSld>
     <p:spTree>
@@ -4146,7 +4291,7 @@
 </p:sld>
 </file>
 
-<file path=ppt/slides/slide16.xml><?xml version="1.0" encoding="utf-8"?>
+<file path=ppt/slides/slide17.xml><?xml version="1.0" encoding="utf-8"?>
 <p:sld xmlns:a="http://schemas.openxmlformats.org/drawingml/2006/main" xmlns:r="http://schemas.openxmlformats.org/officeDocument/2006/relationships" xmlns:p="http://schemas.openxmlformats.org/presentationml/2006/main">
   <p:cSld>
     <p:spTree>
@@ -4213,7 +4358,7 @@
 </p:sld>
 </file>
 
-<file path=ppt/slides/slide17.xml><?xml version="1.0" encoding="utf-8"?>
+<file path=ppt/slides/slide18.xml><?xml version="1.0" encoding="utf-8"?>
 <p:sld xmlns:a="http://schemas.openxmlformats.org/drawingml/2006/main" xmlns:r="http://schemas.openxmlformats.org/officeDocument/2006/relationships" xmlns:p="http://schemas.openxmlformats.org/presentationml/2006/main">
   <p:cSld>
     <p:spTree>
@@ -5007,15 +5152,7 @@
             </a:pPr>
             <a:r>
               <a:rPr lang="en-US" dirty="0" smtClean="0"/>
-              <a:t>Distributed: </a:t>
-            </a:r>
-            <a:r>
-              <a:rPr lang="en-US" dirty="0" err="1" smtClean="0"/>
-              <a:t>Git</a:t>
-            </a:r>
-            <a:r>
-              <a:rPr lang="en-US" dirty="0" smtClean="0"/>
-              <a:t>, Mercurial</a:t>
+              <a:t>Distributed: Git, Mercurial</a:t>
             </a:r>
           </a:p>
           <a:p>

</xml_diff>